<commit_message>
Presentation slides - pptx
</commit_message>
<xml_diff>
--- a/R_Presentation.pptx
+++ b/R_Presentation.pptx
@@ -5,7 +5,7 @@
     <p:sldMasterId id="2147483648" r:id="rId1"/>
   </p:sldMasterIdLst>
   <p:notesMasterIdLst>
-    <p:notesMasterId r:id="rId12"/>
+    <p:notesMasterId r:id="rId13"/>
   </p:notesMasterIdLst>
   <p:sldIdLst>
     <p:sldId id="256" r:id="rId2"/>
@@ -14,10 +14,11 @@
     <p:sldId id="258" r:id="rId5"/>
     <p:sldId id="260" r:id="rId6"/>
     <p:sldId id="262" r:id="rId7"/>
-    <p:sldId id="261" r:id="rId8"/>
-    <p:sldId id="266" r:id="rId9"/>
-    <p:sldId id="259" r:id="rId10"/>
-    <p:sldId id="265" r:id="rId11"/>
+    <p:sldId id="267" r:id="rId8"/>
+    <p:sldId id="261" r:id="rId9"/>
+    <p:sldId id="266" r:id="rId10"/>
+    <p:sldId id="259" r:id="rId11"/>
+    <p:sldId id="265" r:id="rId12"/>
   </p:sldIdLst>
   <p:sldSz cx="12192000" cy="6858000"/>
   <p:notesSz cx="6858000" cy="9144000"/>
@@ -958,57 +959,8 @@
           <a:p>
             <a:r>
               <a:rPr lang="en-GB" dirty="0"/>
-              <a:t>If time allows, ask for participation from the audience</a:t>
-            </a:r>
-          </a:p>
-          <a:p>
-            <a:endParaRPr lang="en-GB" dirty="0"/>
-          </a:p>
-          <a:p>
-            <a:r>
-              <a:rPr lang="en-GB" dirty="0"/>
-              <a:t>Orally: </a:t>
-            </a:r>
-          </a:p>
-          <a:p>
-            <a:r>
-              <a:rPr lang="en-GB" dirty="0"/>
-              <a:t>Animation 1: remember to upload the library in order to be able to access its functions</a:t>
-            </a:r>
-          </a:p>
-          <a:p>
-            <a:r>
-              <a:rPr lang="en-GB" dirty="0"/>
-              <a:t>Animation 2: ‘=‘ in R becomes ‘&lt;-’ and ‘;’ disappears</a:t>
-            </a:r>
-          </a:p>
-          <a:p>
-            <a:r>
-              <a:rPr lang="en-GB" dirty="0"/>
-              <a:t>Animation 4: factor() is an exception in this toolbox, to avoid ambiguous usage, in the toolbox it has to be translated to factors()</a:t>
-            </a:r>
-          </a:p>
-          <a:p>
-            <a:r>
-              <a:rPr lang="en-GB" dirty="0"/>
-              <a:t>Animation 5: in the code file the ‘%’ also have to be converted to ‘#’</a:t>
-            </a:r>
-          </a:p>
-          <a:p>
-            <a:endParaRPr lang="en-GB" dirty="0"/>
-          </a:p>
-          <a:p>
-            <a:r>
-              <a:rPr lang="en-GB" dirty="0"/>
-              <a:t>Underline the simplicity of the translation from MATLAB to R </a:t>
-            </a:r>
-            <a:r>
-              <a:rPr lang="en-GB" dirty="0">
-                <a:sym typeface="Wingdings" panose="05000000000000000000" pitchFamily="2" charset="2"/>
-              </a:rPr>
-              <a:t> thus the usefulness of the toolbox</a:t>
-            </a:r>
-            <a:endParaRPr lang="en-GB" dirty="0"/>
+              <a:t>Underline the point that even with this package the code cannot just be copy and pasted and that some features (like “=“ and “%”) need to be accounted for in the translation</a:t>
+            </a:r>
           </a:p>
         </p:txBody>
       </p:sp>
@@ -1029,7 +981,7 @@
           <a:p>
             <a:fld id="{FA4267E0-1650-41C5-8340-62338E456D49}" type="slidenum">
               <a:rPr lang="en-GB" smtClean="0"/>
-              <a:t>8</a:t>
+              <a:t>7</a:t>
             </a:fld>
             <a:endParaRPr lang="en-GB"/>
           </a:p>
@@ -1038,7 +990,7 @@
     </p:spTree>
     <p:extLst>
       <p:ext uri="{BB962C8B-B14F-4D97-AF65-F5344CB8AC3E}">
-        <p14:creationId xmlns:p14="http://schemas.microsoft.com/office/powerpoint/2010/main" val="3421916172"/>
+        <p14:creationId xmlns:p14="http://schemas.microsoft.com/office/powerpoint/2010/main" val="1267295028"/>
       </p:ext>
     </p:extLst>
   </p:cSld>
@@ -1094,8 +1046,57 @@
           <a:p>
             <a:r>
               <a:rPr lang="en-GB" dirty="0"/>
-              <a:t>These other packages might be useful for people who really want to work on projects that will involve more than one programming language</a:t>
-            </a:r>
+              <a:t>If time allows, ask for participation from the audience</a:t>
+            </a:r>
+          </a:p>
+          <a:p>
+            <a:endParaRPr lang="en-GB" dirty="0"/>
+          </a:p>
+          <a:p>
+            <a:r>
+              <a:rPr lang="en-GB" dirty="0"/>
+              <a:t>Orally: </a:t>
+            </a:r>
+          </a:p>
+          <a:p>
+            <a:r>
+              <a:rPr lang="en-GB" dirty="0"/>
+              <a:t>Animation 1: remember to upload the library in order to be able to access its functions</a:t>
+            </a:r>
+          </a:p>
+          <a:p>
+            <a:r>
+              <a:rPr lang="en-GB" dirty="0"/>
+              <a:t>Animation 2: ‘=‘ in R becomes ‘&lt;-’ and ‘;’ disappears</a:t>
+            </a:r>
+          </a:p>
+          <a:p>
+            <a:r>
+              <a:rPr lang="en-GB" dirty="0"/>
+              <a:t>Animation 4: factor() is an exception in this toolbox, to avoid ambiguous usage, in the toolbox it has to be translated to factors()</a:t>
+            </a:r>
+          </a:p>
+          <a:p>
+            <a:r>
+              <a:rPr lang="en-GB" dirty="0"/>
+              <a:t>Animation 5: in the code file the ‘%’ also have to be converted to ‘#’</a:t>
+            </a:r>
+          </a:p>
+          <a:p>
+            <a:endParaRPr lang="en-GB" dirty="0"/>
+          </a:p>
+          <a:p>
+            <a:r>
+              <a:rPr lang="en-GB" dirty="0"/>
+              <a:t>Underline the simplicity of the translation from MATLAB to R </a:t>
+            </a:r>
+            <a:r>
+              <a:rPr lang="en-GB" dirty="0">
+                <a:sym typeface="Wingdings" panose="05000000000000000000" pitchFamily="2" charset="2"/>
+              </a:rPr>
+              <a:t> thus the usefulness of the toolbox</a:t>
+            </a:r>
+            <a:endParaRPr lang="en-GB" dirty="0"/>
           </a:p>
         </p:txBody>
       </p:sp>
@@ -1117,6 +1118,110 @@
             <a:fld id="{FA4267E0-1650-41C5-8340-62338E456D49}" type="slidenum">
               <a:rPr lang="en-GB" smtClean="0"/>
               <a:t>9</a:t>
+            </a:fld>
+            <a:endParaRPr lang="en-GB"/>
+          </a:p>
+        </p:txBody>
+      </p:sp>
+    </p:spTree>
+    <p:extLst>
+      <p:ext uri="{BB962C8B-B14F-4D97-AF65-F5344CB8AC3E}">
+        <p14:creationId xmlns:p14="http://schemas.microsoft.com/office/powerpoint/2010/main" val="3421916172"/>
+      </p:ext>
+    </p:extLst>
+  </p:cSld>
+  <p:clrMapOvr>
+    <a:masterClrMapping/>
+  </p:clrMapOvr>
+</p:notes>
+</file>
+
+<file path=ppt/notesSlides/notesSlide7.xml><?xml version="1.0" encoding="utf-8"?>
+<p:notes xmlns:a="http://schemas.openxmlformats.org/drawingml/2006/main" xmlns:r="http://schemas.openxmlformats.org/officeDocument/2006/relationships" xmlns:p="http://schemas.openxmlformats.org/presentationml/2006/main">
+  <p:cSld>
+    <p:spTree>
+      <p:nvGrpSpPr>
+        <p:cNvPr id="1" name=""/>
+        <p:cNvGrpSpPr/>
+        <p:nvPr/>
+      </p:nvGrpSpPr>
+      <p:grpSpPr>
+        <a:xfrm>
+          <a:off x="0" y="0"/>
+          <a:ext cx="0" cy="0"/>
+          <a:chOff x="0" y="0"/>
+          <a:chExt cx="0" cy="0"/>
+        </a:xfrm>
+      </p:grpSpPr>
+      <p:sp>
+        <p:nvSpPr>
+          <p:cNvPr id="2" name="Slide Image Placeholder 1"/>
+          <p:cNvSpPr>
+            <a:spLocks noGrp="1" noRot="1" noChangeAspect="1"/>
+          </p:cNvSpPr>
+          <p:nvPr>
+            <p:ph type="sldImg"/>
+          </p:nvPr>
+        </p:nvSpPr>
+        <p:spPr/>
+      </p:sp>
+      <p:sp>
+        <p:nvSpPr>
+          <p:cNvPr id="3" name="Notes Placeholder 2"/>
+          <p:cNvSpPr>
+            <a:spLocks noGrp="1"/>
+          </p:cNvSpPr>
+          <p:nvPr>
+            <p:ph type="body" idx="1"/>
+          </p:nvPr>
+        </p:nvSpPr>
+        <p:spPr/>
+        <p:txBody>
+          <a:bodyPr/>
+          <a:lstStyle/>
+          <a:p>
+            <a:r>
+              <a:rPr lang="en-GB" dirty="0"/>
+              <a:t>These other packages might be useful for people who really want to work on projects that will involve more than one programming language.</a:t>
+            </a:r>
+          </a:p>
+          <a:p>
+            <a:endParaRPr lang="en-GB" dirty="0"/>
+          </a:p>
+          <a:p>
+            <a:r>
+              <a:rPr lang="en-GB" dirty="0"/>
+              <a:t>For instance the </a:t>
+            </a:r>
+            <a:r>
+              <a:rPr lang="en-GB" dirty="0" err="1"/>
+              <a:t>R.matlab</a:t>
+            </a:r>
+            <a:r>
+              <a:rPr lang="en-GB" dirty="0"/>
+              <a:t> will enable the usage of files across both platforms. The reticulate package will work similarly as it will allow to call python in R.</a:t>
+            </a:r>
+          </a:p>
+        </p:txBody>
+      </p:sp>
+      <p:sp>
+        <p:nvSpPr>
+          <p:cNvPr id="4" name="Slide Number Placeholder 3"/>
+          <p:cNvSpPr>
+            <a:spLocks noGrp="1"/>
+          </p:cNvSpPr>
+          <p:nvPr>
+            <p:ph type="sldNum" sz="quarter" idx="5"/>
+          </p:nvPr>
+        </p:nvSpPr>
+        <p:spPr/>
+        <p:txBody>
+          <a:bodyPr/>
+          <a:lstStyle/>
+          <a:p>
+            <a:fld id="{FA4267E0-1650-41C5-8340-62338E456D49}" type="slidenum">
+              <a:rPr lang="en-GB" smtClean="0"/>
+              <a:t>10</a:t>
             </a:fld>
             <a:endParaRPr lang="en-GB"/>
           </a:p>
@@ -4501,15 +4606,15 @@
           <p:cNvPr id="2" name="Title 1">
             <a:extLst>
               <a:ext uri="{FF2B5EF4-FFF2-40B4-BE49-F238E27FC236}">
-                <a16:creationId xmlns:a16="http://schemas.microsoft.com/office/drawing/2014/main" id="{13884209-7706-446C-80B3-972B17475C7F}"/>
-              </a:ext>
-            </a:extLst>
-          </p:cNvPr>
-          <p:cNvSpPr>
-            <a:spLocks noGrp="1"/>
-          </p:cNvSpPr>
-          <p:nvPr>
-            <p:ph type="ctrTitle"/>
+                <a16:creationId xmlns:a16="http://schemas.microsoft.com/office/drawing/2014/main" id="{74A4DEB7-5B09-4AE5-A12D-5F4F00308A1C}"/>
+              </a:ext>
+            </a:extLst>
+          </p:cNvPr>
+          <p:cNvSpPr>
+            <a:spLocks noGrp="1"/>
+          </p:cNvSpPr>
+          <p:nvPr>
+            <p:ph type="title"/>
           </p:nvPr>
         </p:nvSpPr>
         <p:spPr/>
@@ -4519,7 +4624,55 @@
           <a:p>
             <a:r>
               <a:rPr lang="en-GB" dirty="0"/>
-              <a:t>Thank You!</a:t>
+              <a:t>Similar packages</a:t>
+            </a:r>
+          </a:p>
+        </p:txBody>
+      </p:sp>
+      <p:sp>
+        <p:nvSpPr>
+          <p:cNvPr id="3" name="Content Placeholder 2">
+            <a:extLst>
+              <a:ext uri="{FF2B5EF4-FFF2-40B4-BE49-F238E27FC236}">
+                <a16:creationId xmlns:a16="http://schemas.microsoft.com/office/drawing/2014/main" id="{295422BB-CBCE-42A9-AE00-B2A421EBB1FD}"/>
+              </a:ext>
+            </a:extLst>
+          </p:cNvPr>
+          <p:cNvSpPr>
+            <a:spLocks noGrp="1"/>
+          </p:cNvSpPr>
+          <p:nvPr>
+            <p:ph idx="1"/>
+          </p:nvPr>
+        </p:nvSpPr>
+        <p:spPr/>
+        <p:txBody>
+          <a:bodyPr/>
+          <a:lstStyle/>
+          <a:p>
+            <a:pPr>
+              <a:lnSpc>
+                <a:spcPct val="200000"/>
+              </a:lnSpc>
+            </a:pPr>
+            <a:r>
+              <a:rPr lang="en-GB" dirty="0" err="1"/>
+              <a:t>R.matlab</a:t>
+            </a:r>
+            <a:r>
+              <a:rPr lang="en-GB" dirty="0"/>
+              <a:t>: permits to read and write mat files from within R as well as call MATLAB</a:t>
+            </a:r>
+          </a:p>
+          <a:p>
+            <a:pPr>
+              <a:lnSpc>
+                <a:spcPct val="200000"/>
+              </a:lnSpc>
+            </a:pPr>
+            <a:r>
+              <a:rPr lang="en-GB" dirty="0"/>
+              <a:t>Reticulate: R interface to python</a:t>
             </a:r>
           </a:p>
         </p:txBody>
@@ -4529,7 +4682,7 @@
           <p:cNvPr id="4" name="Slide Number Placeholder 3">
             <a:extLst>
               <a:ext uri="{FF2B5EF4-FFF2-40B4-BE49-F238E27FC236}">
-                <a16:creationId xmlns:a16="http://schemas.microsoft.com/office/drawing/2014/main" id="{A6E3C144-6503-4D85-86F8-B1873FD8091F}"/>
+                <a16:creationId xmlns:a16="http://schemas.microsoft.com/office/drawing/2014/main" id="{15ACC8C9-C3ED-4B7B-B5D0-97DA92E9B263}"/>
               </a:ext>
             </a:extLst>
           </p:cNvPr>
@@ -4548,6 +4701,93 @@
             <a:fld id="{D551C831-67BF-49BE-B5E4-0A7E51A4B32D}" type="slidenum">
               <a:rPr lang="en-GB" smtClean="0"/>
               <a:t>10</a:t>
+            </a:fld>
+            <a:endParaRPr lang="en-GB"/>
+          </a:p>
+        </p:txBody>
+      </p:sp>
+    </p:spTree>
+    <p:extLst>
+      <p:ext uri="{BB962C8B-B14F-4D97-AF65-F5344CB8AC3E}">
+        <p14:creationId xmlns:p14="http://schemas.microsoft.com/office/powerpoint/2010/main" val="3333193387"/>
+      </p:ext>
+    </p:extLst>
+  </p:cSld>
+  <p:clrMapOvr>
+    <a:masterClrMapping/>
+  </p:clrMapOvr>
+</p:sld>
+</file>
+
+<file path=ppt/slides/slide11.xml><?xml version="1.0" encoding="utf-8"?>
+<p:sld xmlns:a="http://schemas.openxmlformats.org/drawingml/2006/main" xmlns:r="http://schemas.openxmlformats.org/officeDocument/2006/relationships" xmlns:p="http://schemas.openxmlformats.org/presentationml/2006/main">
+  <p:cSld>
+    <p:spTree>
+      <p:nvGrpSpPr>
+        <p:cNvPr id="1" name=""/>
+        <p:cNvGrpSpPr/>
+        <p:nvPr/>
+      </p:nvGrpSpPr>
+      <p:grpSpPr>
+        <a:xfrm>
+          <a:off x="0" y="0"/>
+          <a:ext cx="0" cy="0"/>
+          <a:chOff x="0" y="0"/>
+          <a:chExt cx="0" cy="0"/>
+        </a:xfrm>
+      </p:grpSpPr>
+      <p:sp>
+        <p:nvSpPr>
+          <p:cNvPr id="2" name="Title 1">
+            <a:extLst>
+              <a:ext uri="{FF2B5EF4-FFF2-40B4-BE49-F238E27FC236}">
+                <a16:creationId xmlns:a16="http://schemas.microsoft.com/office/drawing/2014/main" id="{13884209-7706-446C-80B3-972B17475C7F}"/>
+              </a:ext>
+            </a:extLst>
+          </p:cNvPr>
+          <p:cNvSpPr>
+            <a:spLocks noGrp="1"/>
+          </p:cNvSpPr>
+          <p:nvPr>
+            <p:ph type="ctrTitle"/>
+          </p:nvPr>
+        </p:nvSpPr>
+        <p:spPr/>
+        <p:txBody>
+          <a:bodyPr/>
+          <a:lstStyle/>
+          <a:p>
+            <a:r>
+              <a:rPr lang="en-GB" dirty="0"/>
+              <a:t>Thank You!</a:t>
+            </a:r>
+          </a:p>
+        </p:txBody>
+      </p:sp>
+      <p:sp>
+        <p:nvSpPr>
+          <p:cNvPr id="4" name="Slide Number Placeholder 3">
+            <a:extLst>
+              <a:ext uri="{FF2B5EF4-FFF2-40B4-BE49-F238E27FC236}">
+                <a16:creationId xmlns:a16="http://schemas.microsoft.com/office/drawing/2014/main" id="{A6E3C144-6503-4D85-86F8-B1873FD8091F}"/>
+              </a:ext>
+            </a:extLst>
+          </p:cNvPr>
+          <p:cNvSpPr>
+            <a:spLocks noGrp="1"/>
+          </p:cNvSpPr>
+          <p:nvPr>
+            <p:ph type="sldNum" sz="quarter" idx="12"/>
+          </p:nvPr>
+        </p:nvSpPr>
+        <p:spPr/>
+        <p:txBody>
+          <a:bodyPr/>
+          <a:lstStyle/>
+          <a:p>
+            <a:fld id="{D551C831-67BF-49BE-B5E4-0A7E51A4B32D}" type="slidenum">
+              <a:rPr lang="en-GB" smtClean="0"/>
+              <a:t>11</a:t>
             </a:fld>
             <a:endParaRPr lang="en-GB"/>
           </a:p>
@@ -5898,7 +6138,7 @@
           <a:p>
             <a:r>
               <a:rPr lang="en-GB" dirty="0"/>
-              <a:t>Where can I find out more about it ?</a:t>
+              <a:t>How to translate MATLAB to R ?</a:t>
             </a:r>
           </a:p>
         </p:txBody>
@@ -5922,120 +6162,79 @@
         <p:spPr/>
         <p:txBody>
           <a:bodyPr>
-            <a:normAutofit fontScale="92500" lnSpcReduction="10000"/>
+            <a:normAutofit/>
           </a:bodyPr>
           <a:lstStyle/>
           <a:p>
-            <a:pPr>
-              <a:lnSpc>
-                <a:spcPct val="210000"/>
-              </a:lnSpc>
-            </a:pPr>
             <a:r>
               <a:rPr lang="en-GB" dirty="0"/>
-              <a:t>You can visit the </a:t>
+              <a:t>Some key differences:</a:t>
+            </a:r>
+          </a:p>
+          <a:p>
+            <a:pPr lvl="1"/>
+            <a:r>
+              <a:rPr lang="en-GB" dirty="0"/>
+              <a:t>Assigning variables </a:t>
+            </a:r>
+          </a:p>
+          <a:p>
+            <a:pPr lvl="2"/>
+            <a:r>
+              <a:rPr lang="en-GB" dirty="0"/>
+              <a:t>In MATLAB: “=“</a:t>
+            </a:r>
+          </a:p>
+          <a:p>
+            <a:pPr lvl="2"/>
+            <a:r>
+              <a:rPr lang="en-GB" dirty="0"/>
+              <a:t>In R: “&lt;-”</a:t>
+            </a:r>
+          </a:p>
+          <a:p>
+            <a:pPr lvl="1"/>
+            <a:r>
+              <a:rPr lang="en-GB" dirty="0"/>
+              <a:t>Commenting code</a:t>
+            </a:r>
+          </a:p>
+          <a:p>
+            <a:pPr lvl="2"/>
+            <a:r>
+              <a:rPr lang="en-GB" dirty="0"/>
+              <a:t>In </a:t>
             </a:r>
             <a:r>
               <a:rPr lang="en-GB" dirty="0" err="1"/>
-              <a:t>github</a:t>
+              <a:t>Matlab</a:t>
             </a:r>
             <a:r>
               <a:rPr lang="en-GB" dirty="0"/>
-              <a:t> repository: </a:t>
-            </a:r>
-            <a:r>
-              <a:rPr lang="en-GB" sz="2500" i="1" dirty="0">
-                <a:solidFill>
-                  <a:schemeClr val="accent1">
-                    <a:lumMod val="75000"/>
-                  </a:schemeClr>
-                </a:solidFill>
-              </a:rPr>
-              <a:t>https://github.com/lucasjeaybizot/PresentationCS510_MatlabPackage_R</a:t>
-            </a:r>
-          </a:p>
-          <a:p>
-            <a:pPr>
-              <a:lnSpc>
-                <a:spcPct val="210000"/>
-              </a:lnSpc>
-            </a:pPr>
+              <a:t>: “%”</a:t>
+            </a:r>
+          </a:p>
+          <a:p>
+            <a:pPr lvl="2"/>
             <a:r>
               <a:rPr lang="en-GB" dirty="0"/>
-              <a:t>Open </a:t>
-            </a:r>
-            <a:r>
-              <a:rPr lang="en-GB" i="1" dirty="0" err="1">
-                <a:solidFill>
-                  <a:schemeClr val="bg1">
-                    <a:lumMod val="50000"/>
-                  </a:schemeClr>
-                </a:solidFill>
-              </a:rPr>
-              <a:t>examples.R</a:t>
-            </a:r>
-            <a:r>
-              <a:rPr lang="en-GB" i="1" dirty="0">
-                <a:solidFill>
-                  <a:schemeClr val="bg1">
-                    <a:lumMod val="50000"/>
-                  </a:schemeClr>
-                </a:solidFill>
-              </a:rPr>
-              <a:t> </a:t>
-            </a:r>
+              <a:t>In R: “#”</a:t>
+            </a:r>
+          </a:p>
+          <a:p>
             <a:r>
               <a:rPr lang="en-GB" dirty="0"/>
-              <a:t>to find a list of the packages’ functions and accompanying examples</a:t>
-            </a:r>
-          </a:p>
-          <a:p>
-            <a:pPr>
-              <a:lnSpc>
-                <a:spcPct val="210000"/>
-              </a:lnSpc>
-            </a:pPr>
-            <a:r>
-              <a:rPr lang="en-GB" dirty="0"/>
-              <a:t>Open </a:t>
-            </a:r>
-            <a:r>
-              <a:rPr lang="en-GB" i="1" dirty="0" err="1">
-                <a:solidFill>
-                  <a:schemeClr val="bg1">
-                    <a:lumMod val="50000"/>
-                  </a:schemeClr>
-                </a:solidFill>
-              </a:rPr>
-              <a:t>exercise.R</a:t>
-            </a:r>
-            <a:r>
-              <a:rPr lang="en-GB" dirty="0"/>
-              <a:t> to practice using the repository a little</a:t>
-            </a:r>
-          </a:p>
-          <a:p>
-            <a:pPr>
-              <a:lnSpc>
-                <a:spcPct val="210000"/>
-              </a:lnSpc>
-            </a:pPr>
-            <a:endParaRPr lang="en-GB" i="1" dirty="0">
-              <a:solidFill>
-                <a:schemeClr val="bg1">
-                  <a:lumMod val="50000"/>
-                </a:schemeClr>
-              </a:solidFill>
-            </a:endParaRPr>
-          </a:p>
-        </p:txBody>
-      </p:sp>
-      <p:sp>
-        <p:nvSpPr>
-          <p:cNvPr id="4" name="Slide Number Placeholder 3">
-            <a:extLst>
-              <a:ext uri="{FF2B5EF4-FFF2-40B4-BE49-F238E27FC236}">
-                <a16:creationId xmlns:a16="http://schemas.microsoft.com/office/drawing/2014/main" id="{8C523870-98E0-43EB-8FAB-35D13E7B6221}"/>
+              <a:t>Otherwise, you can just write identically each function included in the package in both languages</a:t>
+            </a:r>
+          </a:p>
+        </p:txBody>
+      </p:sp>
+      <p:sp>
+        <p:nvSpPr>
+          <p:cNvPr id="14" name="Slide Number Placeholder 13">
+            <a:extLst>
+              <a:ext uri="{FF2B5EF4-FFF2-40B4-BE49-F238E27FC236}">
+                <a16:creationId xmlns:a16="http://schemas.microsoft.com/office/drawing/2014/main" id="{258A1492-3C92-4E39-B183-3CF13F7CEE05}"/>
               </a:ext>
             </a:extLst>
           </p:cNvPr>
@@ -6062,7 +6261,7 @@
     </p:spTree>
     <p:extLst>
       <p:ext uri="{BB962C8B-B14F-4D97-AF65-F5344CB8AC3E}">
-        <p14:creationId xmlns:p14="http://schemas.microsoft.com/office/powerpoint/2010/main" val="924063407"/>
+        <p14:creationId xmlns:p14="http://schemas.microsoft.com/office/powerpoint/2010/main" val="2920125134"/>
       </p:ext>
     </p:extLst>
   </p:cSld>
@@ -6111,13 +6310,136 @@
           <a:lstStyle/>
           <a:p>
             <a:r>
+              <a:rPr lang="en-GB" dirty="0"/>
+              <a:t>Where can I find out more about it ?</a:t>
+            </a:r>
+          </a:p>
+        </p:txBody>
+      </p:sp>
+      <p:sp>
+        <p:nvSpPr>
+          <p:cNvPr id="3" name="Content Placeholder 2">
+            <a:extLst>
+              <a:ext uri="{FF2B5EF4-FFF2-40B4-BE49-F238E27FC236}">
+                <a16:creationId xmlns:a16="http://schemas.microsoft.com/office/drawing/2014/main" id="{295422BB-CBCE-42A9-AE00-B2A421EBB1FD}"/>
+              </a:ext>
+            </a:extLst>
+          </p:cNvPr>
+          <p:cNvSpPr>
+            <a:spLocks noGrp="1"/>
+          </p:cNvSpPr>
+          <p:nvPr>
+            <p:ph idx="1"/>
+          </p:nvPr>
+        </p:nvSpPr>
+        <p:spPr/>
+        <p:txBody>
+          <a:bodyPr>
+            <a:normAutofit fontScale="92500" lnSpcReduction="10000"/>
+          </a:bodyPr>
+          <a:lstStyle/>
+          <a:p>
+            <a:pPr>
+              <a:lnSpc>
+                <a:spcPct val="210000"/>
+              </a:lnSpc>
+            </a:pPr>
+            <a:r>
+              <a:rPr lang="en-GB" dirty="0"/>
+              <a:t>You can visit the </a:t>
+            </a:r>
+            <a:r>
               <a:rPr lang="en-GB" dirty="0" err="1"/>
-              <a:t>Exercise.R</a:t>
+              <a:t>github</a:t>
             </a:r>
             <a:r>
               <a:rPr lang="en-GB" dirty="0"/>
-              <a:t> walkthrough solution</a:t>
-            </a:r>
+              <a:t> repository: </a:t>
+            </a:r>
+            <a:r>
+              <a:rPr lang="en-GB" sz="2500" i="1" dirty="0">
+                <a:solidFill>
+                  <a:schemeClr val="accent1">
+                    <a:lumMod val="75000"/>
+                  </a:schemeClr>
+                </a:solidFill>
+              </a:rPr>
+              <a:t>https://github.com/lucasjeaybizot/PresentationCS510_MatlabPackage_R</a:t>
+            </a:r>
+          </a:p>
+          <a:p>
+            <a:pPr>
+              <a:lnSpc>
+                <a:spcPct val="210000"/>
+              </a:lnSpc>
+            </a:pPr>
+            <a:r>
+              <a:rPr lang="en-GB" dirty="0"/>
+              <a:t>Open </a:t>
+            </a:r>
+            <a:r>
+              <a:rPr lang="en-GB" i="1" dirty="0" err="1">
+                <a:solidFill>
+                  <a:schemeClr val="bg1">
+                    <a:lumMod val="50000"/>
+                  </a:schemeClr>
+                </a:solidFill>
+              </a:rPr>
+              <a:t>examples.R</a:t>
+            </a:r>
+            <a:r>
+              <a:rPr lang="en-GB" i="1" dirty="0">
+                <a:solidFill>
+                  <a:schemeClr val="bg1">
+                    <a:lumMod val="50000"/>
+                  </a:schemeClr>
+                </a:solidFill>
+              </a:rPr>
+              <a:t> </a:t>
+            </a:r>
+            <a:r>
+              <a:rPr lang="en-GB" dirty="0"/>
+              <a:t>to find a list of the packages’ functions and accompanying examples</a:t>
+            </a:r>
+          </a:p>
+          <a:p>
+            <a:pPr>
+              <a:lnSpc>
+                <a:spcPct val="210000"/>
+              </a:lnSpc>
+            </a:pPr>
+            <a:r>
+              <a:rPr lang="en-GB" dirty="0"/>
+              <a:t>Open </a:t>
+            </a:r>
+            <a:r>
+              <a:rPr lang="en-GB" i="1" dirty="0" err="1">
+                <a:solidFill>
+                  <a:schemeClr val="bg1">
+                    <a:lumMod val="50000"/>
+                  </a:schemeClr>
+                </a:solidFill>
+              </a:rPr>
+              <a:t>exercise.R</a:t>
+            </a:r>
+            <a:r>
+              <a:rPr lang="en-GB" dirty="0"/>
+              <a:t> to practice using the repository a little</a:t>
+            </a:r>
+          </a:p>
+          <a:p>
+            <a:pPr>
+              <a:lnSpc>
+                <a:spcPct val="210000"/>
+              </a:lnSpc>
+            </a:pPr>
+            <a:endParaRPr lang="en-GB" i="1" dirty="0">
+              <a:solidFill>
+                <a:schemeClr val="bg1">
+                  <a:lumMod val="50000"/>
+                </a:schemeClr>
+              </a:solidFill>
+            </a:endParaRPr>
           </a:p>
         </p:txBody>
       </p:sp>
@@ -6145,6 +6467,97 @@
             <a:fld id="{D551C831-67BF-49BE-B5E4-0A7E51A4B32D}" type="slidenum">
               <a:rPr lang="en-GB" smtClean="0"/>
               <a:t>8</a:t>
+            </a:fld>
+            <a:endParaRPr lang="en-GB"/>
+          </a:p>
+        </p:txBody>
+      </p:sp>
+    </p:spTree>
+    <p:extLst>
+      <p:ext uri="{BB962C8B-B14F-4D97-AF65-F5344CB8AC3E}">
+        <p14:creationId xmlns:p14="http://schemas.microsoft.com/office/powerpoint/2010/main" val="924063407"/>
+      </p:ext>
+    </p:extLst>
+  </p:cSld>
+  <p:clrMapOvr>
+    <a:masterClrMapping/>
+  </p:clrMapOvr>
+</p:sld>
+</file>
+
+<file path=ppt/slides/slide9.xml><?xml version="1.0" encoding="utf-8"?>
+<p:sld xmlns:a="http://schemas.openxmlformats.org/drawingml/2006/main" xmlns:r="http://schemas.openxmlformats.org/officeDocument/2006/relationships" xmlns:p="http://schemas.openxmlformats.org/presentationml/2006/main">
+  <p:cSld>
+    <p:spTree>
+      <p:nvGrpSpPr>
+        <p:cNvPr id="1" name=""/>
+        <p:cNvGrpSpPr/>
+        <p:nvPr/>
+      </p:nvGrpSpPr>
+      <p:grpSpPr>
+        <a:xfrm>
+          <a:off x="0" y="0"/>
+          <a:ext cx="0" cy="0"/>
+          <a:chOff x="0" y="0"/>
+          <a:chExt cx="0" cy="0"/>
+        </a:xfrm>
+      </p:grpSpPr>
+      <p:sp>
+        <p:nvSpPr>
+          <p:cNvPr id="2" name="Title 1">
+            <a:extLst>
+              <a:ext uri="{FF2B5EF4-FFF2-40B4-BE49-F238E27FC236}">
+                <a16:creationId xmlns:a16="http://schemas.microsoft.com/office/drawing/2014/main" id="{74A4DEB7-5B09-4AE5-A12D-5F4F00308A1C}"/>
+              </a:ext>
+            </a:extLst>
+          </p:cNvPr>
+          <p:cNvSpPr>
+            <a:spLocks noGrp="1"/>
+          </p:cNvSpPr>
+          <p:nvPr>
+            <p:ph type="title"/>
+          </p:nvPr>
+        </p:nvSpPr>
+        <p:spPr/>
+        <p:txBody>
+          <a:bodyPr/>
+          <a:lstStyle/>
+          <a:p>
+            <a:r>
+              <a:rPr lang="en-GB" dirty="0" err="1"/>
+              <a:t>Exercise.R</a:t>
+            </a:r>
+            <a:r>
+              <a:rPr lang="en-GB" dirty="0"/>
+              <a:t> walkthrough solution</a:t>
+            </a:r>
+          </a:p>
+        </p:txBody>
+      </p:sp>
+      <p:sp>
+        <p:nvSpPr>
+          <p:cNvPr id="4" name="Slide Number Placeholder 3">
+            <a:extLst>
+              <a:ext uri="{FF2B5EF4-FFF2-40B4-BE49-F238E27FC236}">
+                <a16:creationId xmlns:a16="http://schemas.microsoft.com/office/drawing/2014/main" id="{8C523870-98E0-43EB-8FAB-35D13E7B6221}"/>
+              </a:ext>
+            </a:extLst>
+          </p:cNvPr>
+          <p:cNvSpPr>
+            <a:spLocks noGrp="1"/>
+          </p:cNvSpPr>
+          <p:nvPr>
+            <p:ph type="sldNum" sz="quarter" idx="12"/>
+          </p:nvPr>
+        </p:nvSpPr>
+        <p:spPr/>
+        <p:txBody>
+          <a:bodyPr/>
+          <a:lstStyle/>
+          <a:p>
+            <a:fld id="{D551C831-67BF-49BE-B5E4-0A7E51A4B32D}" type="slidenum">
+              <a:rPr lang="en-GB" smtClean="0"/>
+              <a:t>9</a:t>
             </a:fld>
             <a:endParaRPr lang="en-GB"/>
           </a:p>
@@ -6797,141 +7210,6 @@
       </p:par>
     </p:tnLst>
   </p:timing>
-</p:sld>
-</file>
-
-<file path=ppt/slides/slide9.xml><?xml version="1.0" encoding="utf-8"?>
-<p:sld xmlns:a="http://schemas.openxmlformats.org/drawingml/2006/main" xmlns:r="http://schemas.openxmlformats.org/officeDocument/2006/relationships" xmlns:p="http://schemas.openxmlformats.org/presentationml/2006/main">
-  <p:cSld>
-    <p:spTree>
-      <p:nvGrpSpPr>
-        <p:cNvPr id="1" name=""/>
-        <p:cNvGrpSpPr/>
-        <p:nvPr/>
-      </p:nvGrpSpPr>
-      <p:grpSpPr>
-        <a:xfrm>
-          <a:off x="0" y="0"/>
-          <a:ext cx="0" cy="0"/>
-          <a:chOff x="0" y="0"/>
-          <a:chExt cx="0" cy="0"/>
-        </a:xfrm>
-      </p:grpSpPr>
-      <p:sp>
-        <p:nvSpPr>
-          <p:cNvPr id="2" name="Title 1">
-            <a:extLst>
-              <a:ext uri="{FF2B5EF4-FFF2-40B4-BE49-F238E27FC236}">
-                <a16:creationId xmlns:a16="http://schemas.microsoft.com/office/drawing/2014/main" id="{74A4DEB7-5B09-4AE5-A12D-5F4F00308A1C}"/>
-              </a:ext>
-            </a:extLst>
-          </p:cNvPr>
-          <p:cNvSpPr>
-            <a:spLocks noGrp="1"/>
-          </p:cNvSpPr>
-          <p:nvPr>
-            <p:ph type="title"/>
-          </p:nvPr>
-        </p:nvSpPr>
-        <p:spPr/>
-        <p:txBody>
-          <a:bodyPr/>
-          <a:lstStyle/>
-          <a:p>
-            <a:r>
-              <a:rPr lang="en-GB" dirty="0"/>
-              <a:t>Similar packages</a:t>
-            </a:r>
-          </a:p>
-        </p:txBody>
-      </p:sp>
-      <p:sp>
-        <p:nvSpPr>
-          <p:cNvPr id="3" name="Content Placeholder 2">
-            <a:extLst>
-              <a:ext uri="{FF2B5EF4-FFF2-40B4-BE49-F238E27FC236}">
-                <a16:creationId xmlns:a16="http://schemas.microsoft.com/office/drawing/2014/main" id="{295422BB-CBCE-42A9-AE00-B2A421EBB1FD}"/>
-              </a:ext>
-            </a:extLst>
-          </p:cNvPr>
-          <p:cNvSpPr>
-            <a:spLocks noGrp="1"/>
-          </p:cNvSpPr>
-          <p:nvPr>
-            <p:ph idx="1"/>
-          </p:nvPr>
-        </p:nvSpPr>
-        <p:spPr/>
-        <p:txBody>
-          <a:bodyPr/>
-          <a:lstStyle/>
-          <a:p>
-            <a:pPr>
-              <a:lnSpc>
-                <a:spcPct val="200000"/>
-              </a:lnSpc>
-            </a:pPr>
-            <a:r>
-              <a:rPr lang="en-GB" dirty="0" err="1"/>
-              <a:t>R.matlab</a:t>
-            </a:r>
-            <a:r>
-              <a:rPr lang="en-GB" dirty="0"/>
-              <a:t>: permits to read and write mat files from within R as well as call MATLAB</a:t>
-            </a:r>
-          </a:p>
-          <a:p>
-            <a:pPr>
-              <a:lnSpc>
-                <a:spcPct val="200000"/>
-              </a:lnSpc>
-            </a:pPr>
-            <a:r>
-              <a:rPr lang="en-GB" dirty="0"/>
-              <a:t>Reticulate: R interface to python</a:t>
-            </a:r>
-          </a:p>
-        </p:txBody>
-      </p:sp>
-      <p:sp>
-        <p:nvSpPr>
-          <p:cNvPr id="4" name="Slide Number Placeholder 3">
-            <a:extLst>
-              <a:ext uri="{FF2B5EF4-FFF2-40B4-BE49-F238E27FC236}">
-                <a16:creationId xmlns:a16="http://schemas.microsoft.com/office/drawing/2014/main" id="{15ACC8C9-C3ED-4B7B-B5D0-97DA92E9B263}"/>
-              </a:ext>
-            </a:extLst>
-          </p:cNvPr>
-          <p:cNvSpPr>
-            <a:spLocks noGrp="1"/>
-          </p:cNvSpPr>
-          <p:nvPr>
-            <p:ph type="sldNum" sz="quarter" idx="12"/>
-          </p:nvPr>
-        </p:nvSpPr>
-        <p:spPr/>
-        <p:txBody>
-          <a:bodyPr/>
-          <a:lstStyle/>
-          <a:p>
-            <a:fld id="{D551C831-67BF-49BE-B5E4-0A7E51A4B32D}" type="slidenum">
-              <a:rPr lang="en-GB" smtClean="0"/>
-              <a:t>9</a:t>
-            </a:fld>
-            <a:endParaRPr lang="en-GB"/>
-          </a:p>
-        </p:txBody>
-      </p:sp>
-    </p:spTree>
-    <p:extLst>
-      <p:ext uri="{BB962C8B-B14F-4D97-AF65-F5344CB8AC3E}">
-        <p14:creationId xmlns:p14="http://schemas.microsoft.com/office/powerpoint/2010/main" val="3333193387"/>
-      </p:ext>
-    </p:extLst>
-  </p:cSld>
-  <p:clrMapOvr>
-    <a:masterClrMapping/>
-  </p:clrMapOvr>
 </p:sld>
 </file>
 

</xml_diff>